<commit_message>
Update .NET core 3 presentation
</commit_message>
<xml_diff>
--- a/.NET Core 3 in a nutshell.pptx
+++ b/.NET Core 3 in a nutshell.pptx
@@ -5566,6 +5566,60 @@
             </a:r>
           </a:p>
           <a:p>
+            <a:r>
+              <a:rPr lang="en-GB" sz="900" kern="1200" dirty="0" err="1">
+                <a:solidFill>
+                  <a:schemeClr val="tx1"/>
+                </a:solidFill>
+                <a:latin typeface="+mn-lt"/>
+                <a:ea typeface="+mn-ea"/>
+                <a:cs typeface="+mn-cs"/>
+              </a:rPr>
+              <a:t>ConfigureWebHostDefaults</a:t>
+            </a:r>
+            <a:r>
+              <a:rPr lang="en-GB" sz="900" kern="1200" dirty="0">
+                <a:solidFill>
+                  <a:schemeClr val="tx1"/>
+                </a:solidFill>
+                <a:latin typeface="+mn-lt"/>
+                <a:ea typeface="+mn-ea"/>
+                <a:cs typeface="+mn-cs"/>
+              </a:rPr>
+              <a:t> </a:t>
+            </a:r>
+            <a:r>
+              <a:rPr lang="en-GB" sz="900" kern="1200" dirty="0" err="1">
+                <a:solidFill>
+                  <a:schemeClr val="tx1"/>
+                </a:solidFill>
+                <a:latin typeface="+mn-lt"/>
+                <a:ea typeface="+mn-ea"/>
+                <a:cs typeface="+mn-cs"/>
+              </a:rPr>
+              <a:t>UseKestrel</a:t>
+            </a:r>
+            <a:endParaRPr lang="en-GB" sz="900" kern="1200" dirty="0">
+              <a:solidFill>
+                <a:schemeClr val="tx1"/>
+              </a:solidFill>
+              <a:latin typeface="+mn-lt"/>
+              <a:ea typeface="+mn-ea"/>
+              <a:cs typeface="+mn-cs"/>
+            </a:endParaRPr>
+          </a:p>
+          <a:p>
+            <a:r>
+              <a:rPr lang="en-GB" sz="900" kern="1200" dirty="0" err="1">
+                <a:solidFill>
+                  <a:schemeClr val="tx1"/>
+                </a:solidFill>
+                <a:latin typeface="+mn-lt"/>
+                <a:ea typeface="+mn-ea"/>
+                <a:cs typeface="+mn-cs"/>
+              </a:rPr>
+              <a:t>ConfigureKestrel</a:t>
+            </a:r>
             <a:endParaRPr lang="en-GB" dirty="0"/>
           </a:p>
         </p:txBody>
@@ -16500,6 +16554,9 @@
           <a:lstStyle/>
           <a:p>
             <a:pPr marL="285750" indent="-285750">
+              <a:spcAft>
+                <a:spcPts val="1200"/>
+              </a:spcAft>
               <a:buFont typeface="Arial" panose="020B0604020202020204" pitchFamily="34" charset="0"/>
               <a:buChar char="•"/>
             </a:pPr>
@@ -16510,6 +16567,9 @@
           </a:p>
           <a:p>
             <a:pPr marL="285750" indent="-285750">
+              <a:spcAft>
+                <a:spcPts val="1200"/>
+              </a:spcAft>
               <a:buFont typeface="Arial" panose="020B0604020202020204" pitchFamily="34" charset="0"/>
               <a:buChar char="•"/>
             </a:pPr>
@@ -16540,6 +16600,9 @@
           </a:p>
           <a:p>
             <a:pPr marL="285750" indent="-285750">
+              <a:spcAft>
+                <a:spcPts val="1200"/>
+              </a:spcAft>
               <a:buFont typeface="Arial" panose="020B0604020202020204" pitchFamily="34" charset="0"/>
               <a:buChar char="•"/>
             </a:pPr>
@@ -16550,16 +16613,22 @@
           </a:p>
           <a:p>
             <a:pPr marL="285750" indent="-285750">
+              <a:spcAft>
+                <a:spcPts val="1200"/>
+              </a:spcAft>
               <a:buFont typeface="Arial" panose="020B0604020202020204" pitchFamily="34" charset="0"/>
               <a:buChar char="•"/>
             </a:pPr>
             <a:r>
               <a:rPr lang="en-GB" dirty="0"/>
-              <a:t>DI with unity</a:t>
+              <a:t>DI</a:t>
             </a:r>
           </a:p>
           <a:p>
             <a:pPr marL="285750" indent="-285750">
+              <a:spcAft>
+                <a:spcPts val="1200"/>
+              </a:spcAft>
               <a:buFont typeface="Arial" panose="020B0604020202020204" pitchFamily="34" charset="0"/>
               <a:buChar char="•"/>
             </a:pPr>
@@ -16570,6 +16639,9 @@
           </a:p>
           <a:p>
             <a:pPr marL="285750" indent="-285750">
+              <a:spcAft>
+                <a:spcPts val="1200"/>
+              </a:spcAft>
               <a:buFont typeface="Arial" panose="020B0604020202020204" pitchFamily="34" charset="0"/>
               <a:buChar char="•"/>
             </a:pPr>
@@ -16580,6 +16652,9 @@
           </a:p>
           <a:p>
             <a:pPr marL="285750" indent="-285750">
+              <a:spcAft>
+                <a:spcPts val="1200"/>
+              </a:spcAft>
               <a:buFont typeface="Arial" panose="020B0604020202020204" pitchFamily="34" charset="0"/>
               <a:buChar char="•"/>
             </a:pPr>
@@ -16594,6 +16669,9 @@
           </a:p>
           <a:p>
             <a:pPr marL="285750" indent="-285750">
+              <a:spcAft>
+                <a:spcPts val="1200"/>
+              </a:spcAft>
               <a:buFont typeface="Arial" panose="020B0604020202020204" pitchFamily="34" charset="0"/>
               <a:buChar char="•"/>
             </a:pPr>

</xml_diff>